<commit_message>
Added file write code
</commit_message>
<xml_diff>
--- a/Project Details.pptx
+++ b/Project Details.pptx
@@ -159,30 +159,6 @@
 <file path=ppt/changesInfos/changesInfo1.xml><?xml version="1.0" encoding="utf-8"?>
 <pc:chgInfo xmlns:a="http://schemas.openxmlformats.org/drawingml/2006/main" xmlns:r="http://schemas.openxmlformats.org/officeDocument/2006/relationships" xmlns:ac="http://schemas.microsoft.com/office/drawing/2013/main/command" xmlns:pc="http://schemas.microsoft.com/office/powerpoint/2013/main/command">
   <pc:docChgLst>
-    <pc:chgData name="Maithripala, Hareendra" userId="1310d60e-cdaa-4c92-8e49-1883b66d632b" providerId="ADAL" clId="{9CE0BD6A-0C1A-4715-9584-EBC473AE9FCE}"/>
-    <pc:docChg chg="modSld">
-      <pc:chgData name="Maithripala, Hareendra" userId="1310d60e-cdaa-4c92-8e49-1883b66d632b" providerId="ADAL" clId="{9CE0BD6A-0C1A-4715-9584-EBC473AE9FCE}" dt="2024-09-19T07:57:34.757" v="51" actId="6549"/>
-      <pc:docMkLst>
-        <pc:docMk/>
-      </pc:docMkLst>
-      <pc:sldChg chg="modSp mod">
-        <pc:chgData name="Maithripala, Hareendra" userId="1310d60e-cdaa-4c92-8e49-1883b66d632b" providerId="ADAL" clId="{9CE0BD6A-0C1A-4715-9584-EBC473AE9FCE}" dt="2024-09-19T07:57:34.757" v="51" actId="6549"/>
-        <pc:sldMkLst>
-          <pc:docMk/>
-          <pc:sldMk cId="707541242" sldId="2771"/>
-        </pc:sldMkLst>
-        <pc:spChg chg="mod">
-          <ac:chgData name="Maithripala, Hareendra" userId="1310d60e-cdaa-4c92-8e49-1883b66d632b" providerId="ADAL" clId="{9CE0BD6A-0C1A-4715-9584-EBC473AE9FCE}" dt="2024-09-19T07:57:34.757" v="51" actId="6549"/>
-          <ac:spMkLst>
-            <pc:docMk/>
-            <pc:sldMk cId="707541242" sldId="2771"/>
-            <ac:spMk id="2" creationId="{E9BFBF43-EC48-4844-A435-332409B21468}"/>
-          </ac:spMkLst>
-        </pc:spChg>
-      </pc:sldChg>
-    </pc:docChg>
-  </pc:docChgLst>
-  <pc:docChgLst>
     <pc:chgData name="Maithripala, Hareendra" userId="1310d60e-cdaa-4c92-8e49-1883b66d632b" providerId="ADAL" clId="{DE1FD26C-3D76-4007-8A34-044AEC3B753E}"/>
     <pc:docChg chg="undo custSel addSld delSld modSld sldOrd">
       <pc:chgData name="Maithripala, Hareendra" userId="1310d60e-cdaa-4c92-8e49-1883b66d632b" providerId="ADAL" clId="{DE1FD26C-3D76-4007-8A34-044AEC3B753E}" dt="2023-03-02T15:07:11.602" v="12426" actId="47"/>
@@ -2033,38 +2009,23 @@
     </pc:docChg>
   </pc:docChgLst>
   <pc:docChgLst>
-    <pc:chgData name="Maithripala, Hareendra" userId="1310d60e-cdaa-4c92-8e49-1883b66d632b" providerId="ADAL" clId="{D3D9C3D3-DABF-4A37-98D9-1B30A8FC1749}"/>
+    <pc:chgData name="Maithripala, Hareendra" userId="1310d60e-cdaa-4c92-8e49-1883b66d632b" providerId="ADAL" clId="{909B7D1B-D353-45F6-BDED-513A6B034E32}"/>
     <pc:docChg chg="modSld">
-      <pc:chgData name="Maithripala, Hareendra" userId="1310d60e-cdaa-4c92-8e49-1883b66d632b" providerId="ADAL" clId="{D3D9C3D3-DABF-4A37-98D9-1B30A8FC1749}" dt="2023-05-15T08:11:09.640" v="13" actId="6549"/>
+      <pc:chgData name="Maithripala, Hareendra" userId="1310d60e-cdaa-4c92-8e49-1883b66d632b" providerId="ADAL" clId="{909B7D1B-D353-45F6-BDED-513A6B034E32}" dt="2023-05-15T10:03:13.707" v="22" actId="20577"/>
       <pc:docMkLst>
         <pc:docMk/>
       </pc:docMkLst>
-      <pc:sldChg chg="modSp">
-        <pc:chgData name="Maithripala, Hareendra" userId="1310d60e-cdaa-4c92-8e49-1883b66d632b" providerId="ADAL" clId="{D3D9C3D3-DABF-4A37-98D9-1B30A8FC1749}" dt="2023-05-15T08:11:09.640" v="13" actId="6549"/>
+      <pc:sldChg chg="modSp mod">
+        <pc:chgData name="Maithripala, Hareendra" userId="1310d60e-cdaa-4c92-8e49-1883b66d632b" providerId="ADAL" clId="{909B7D1B-D353-45F6-BDED-513A6B034E32}" dt="2023-05-15T10:03:13.707" v="22" actId="20577"/>
         <pc:sldMkLst>
           <pc:docMk/>
-          <pc:sldMk cId="2465699945" sldId="269"/>
+          <pc:sldMk cId="707541242" sldId="2771"/>
         </pc:sldMkLst>
         <pc:spChg chg="mod">
-          <ac:chgData name="Maithripala, Hareendra" userId="1310d60e-cdaa-4c92-8e49-1883b66d632b" providerId="ADAL" clId="{D3D9C3D3-DABF-4A37-98D9-1B30A8FC1749}" dt="2023-05-15T08:11:09.640" v="13" actId="6549"/>
+          <ac:chgData name="Maithripala, Hareendra" userId="1310d60e-cdaa-4c92-8e49-1883b66d632b" providerId="ADAL" clId="{909B7D1B-D353-45F6-BDED-513A6B034E32}" dt="2023-05-15T10:03:13.707" v="22" actId="20577"/>
           <ac:spMkLst>
             <pc:docMk/>
-            <pc:sldMk cId="2465699945" sldId="269"/>
-            <ac:spMk id="5" creationId="{B52C081B-E2BF-4116-A2A5-BF56DB6BCCD4}"/>
-          </ac:spMkLst>
-        </pc:spChg>
-      </pc:sldChg>
-      <pc:sldChg chg="modSp mod">
-        <pc:chgData name="Maithripala, Hareendra" userId="1310d60e-cdaa-4c92-8e49-1883b66d632b" providerId="ADAL" clId="{D3D9C3D3-DABF-4A37-98D9-1B30A8FC1749}" dt="2023-05-11T08:12:21.594" v="8" actId="6549"/>
-        <pc:sldMkLst>
-          <pc:docMk/>
-          <pc:sldMk cId="2134513463" sldId="2786"/>
-        </pc:sldMkLst>
-        <pc:spChg chg="mod">
-          <ac:chgData name="Maithripala, Hareendra" userId="1310d60e-cdaa-4c92-8e49-1883b66d632b" providerId="ADAL" clId="{D3D9C3D3-DABF-4A37-98D9-1B30A8FC1749}" dt="2023-05-11T08:12:21.594" v="8" actId="6549"/>
-          <ac:spMkLst>
-            <pc:docMk/>
-            <pc:sldMk cId="2134513463" sldId="2786"/>
+            <pc:sldMk cId="707541242" sldId="2771"/>
             <ac:spMk id="2" creationId="{E9BFBF43-EC48-4844-A435-332409B21468}"/>
           </ac:spMkLst>
         </pc:spChg>
@@ -3716,20 +3677,20 @@
     </pc:docChg>
   </pc:docChgLst>
   <pc:docChgLst>
-    <pc:chgData name="Maithripala, Hareendra" userId="1310d60e-cdaa-4c92-8e49-1883b66d632b" providerId="ADAL" clId="{909B7D1B-D353-45F6-BDED-513A6B034E32}"/>
+    <pc:chgData name="Maithripala, Hareendra" userId="1310d60e-cdaa-4c92-8e49-1883b66d632b" providerId="ADAL" clId="{9CE0BD6A-0C1A-4715-9584-EBC473AE9FCE}"/>
     <pc:docChg chg="modSld">
-      <pc:chgData name="Maithripala, Hareendra" userId="1310d60e-cdaa-4c92-8e49-1883b66d632b" providerId="ADAL" clId="{909B7D1B-D353-45F6-BDED-513A6B034E32}" dt="2023-05-15T10:03:13.707" v="22" actId="20577"/>
+      <pc:chgData name="Maithripala, Hareendra" userId="1310d60e-cdaa-4c92-8e49-1883b66d632b" providerId="ADAL" clId="{9CE0BD6A-0C1A-4715-9584-EBC473AE9FCE}" dt="2024-09-19T07:57:34.757" v="51" actId="6549"/>
       <pc:docMkLst>
         <pc:docMk/>
       </pc:docMkLst>
       <pc:sldChg chg="modSp mod">
-        <pc:chgData name="Maithripala, Hareendra" userId="1310d60e-cdaa-4c92-8e49-1883b66d632b" providerId="ADAL" clId="{909B7D1B-D353-45F6-BDED-513A6B034E32}" dt="2023-05-15T10:03:13.707" v="22" actId="20577"/>
+        <pc:chgData name="Maithripala, Hareendra" userId="1310d60e-cdaa-4c92-8e49-1883b66d632b" providerId="ADAL" clId="{9CE0BD6A-0C1A-4715-9584-EBC473AE9FCE}" dt="2024-09-19T07:57:34.757" v="51" actId="6549"/>
         <pc:sldMkLst>
           <pc:docMk/>
           <pc:sldMk cId="707541242" sldId="2771"/>
         </pc:sldMkLst>
         <pc:spChg chg="mod">
-          <ac:chgData name="Maithripala, Hareendra" userId="1310d60e-cdaa-4c92-8e49-1883b66d632b" providerId="ADAL" clId="{909B7D1B-D353-45F6-BDED-513A6B034E32}" dt="2023-05-15T10:03:13.707" v="22" actId="20577"/>
+          <ac:chgData name="Maithripala, Hareendra" userId="1310d60e-cdaa-4c92-8e49-1883b66d632b" providerId="ADAL" clId="{9CE0BD6A-0C1A-4715-9584-EBC473AE9FCE}" dt="2024-09-19T07:57:34.757" v="51" actId="6549"/>
           <ac:spMkLst>
             <pc:docMk/>
             <pc:sldMk cId="707541242" sldId="2771"/>
@@ -3774,6 +3735,45 @@
             <pc:docMk/>
             <pc:sldMk cId="1811717883" sldId="2804"/>
             <ac:spMk id="22" creationId="{6F9A55E9-15FB-43F0-9FAD-E0B31F5AD2C4}"/>
+          </ac:spMkLst>
+        </pc:spChg>
+      </pc:sldChg>
+    </pc:docChg>
+  </pc:docChgLst>
+  <pc:docChgLst>
+    <pc:chgData name="Maithripala, Hareendra" userId="1310d60e-cdaa-4c92-8e49-1883b66d632b" providerId="ADAL" clId="{D3D9C3D3-DABF-4A37-98D9-1B30A8FC1749}"/>
+    <pc:docChg chg="modSld">
+      <pc:chgData name="Maithripala, Hareendra" userId="1310d60e-cdaa-4c92-8e49-1883b66d632b" providerId="ADAL" clId="{D3D9C3D3-DABF-4A37-98D9-1B30A8FC1749}" dt="2023-05-15T08:11:09.640" v="13" actId="6549"/>
+      <pc:docMkLst>
+        <pc:docMk/>
+      </pc:docMkLst>
+      <pc:sldChg chg="modSp">
+        <pc:chgData name="Maithripala, Hareendra" userId="1310d60e-cdaa-4c92-8e49-1883b66d632b" providerId="ADAL" clId="{D3D9C3D3-DABF-4A37-98D9-1B30A8FC1749}" dt="2023-05-15T08:11:09.640" v="13" actId="6549"/>
+        <pc:sldMkLst>
+          <pc:docMk/>
+          <pc:sldMk cId="2465699945" sldId="269"/>
+        </pc:sldMkLst>
+        <pc:spChg chg="mod">
+          <ac:chgData name="Maithripala, Hareendra" userId="1310d60e-cdaa-4c92-8e49-1883b66d632b" providerId="ADAL" clId="{D3D9C3D3-DABF-4A37-98D9-1B30A8FC1749}" dt="2023-05-15T08:11:09.640" v="13" actId="6549"/>
+          <ac:spMkLst>
+            <pc:docMk/>
+            <pc:sldMk cId="2465699945" sldId="269"/>
+            <ac:spMk id="5" creationId="{B52C081B-E2BF-4116-A2A5-BF56DB6BCCD4}"/>
+          </ac:spMkLst>
+        </pc:spChg>
+      </pc:sldChg>
+      <pc:sldChg chg="modSp mod">
+        <pc:chgData name="Maithripala, Hareendra" userId="1310d60e-cdaa-4c92-8e49-1883b66d632b" providerId="ADAL" clId="{D3D9C3D3-DABF-4A37-98D9-1B30A8FC1749}" dt="2023-05-11T08:12:21.594" v="8" actId="6549"/>
+        <pc:sldMkLst>
+          <pc:docMk/>
+          <pc:sldMk cId="2134513463" sldId="2786"/>
+        </pc:sldMkLst>
+        <pc:spChg chg="mod">
+          <ac:chgData name="Maithripala, Hareendra" userId="1310d60e-cdaa-4c92-8e49-1883b66d632b" providerId="ADAL" clId="{D3D9C3D3-DABF-4A37-98D9-1B30A8FC1749}" dt="2023-05-11T08:12:21.594" v="8" actId="6549"/>
+          <ac:spMkLst>
+            <pc:docMk/>
+            <pc:sldMk cId="2134513463" sldId="2786"/>
+            <ac:spMk id="2" creationId="{E9BFBF43-EC48-4844-A435-332409B21468}"/>
           </ac:spMkLst>
         </pc:spChg>
       </pc:sldChg>
@@ -3864,7 +3864,7 @@
           <a:p>
             <a:fld id="{E519E6DB-3108-45CC-BD75-81BE0C5BAE47}" type="datetimeFigureOut">
               <a:rPr lang="en-GB" smtClean="0"/>
-              <a:t>19/09/2024</a:t>
+              <a:t>30/09/2024</a:t>
             </a:fld>
             <a:endParaRPr lang="en-GB"/>
           </a:p>
@@ -34956,6 +34956,12 @@
 </file>
 
 <file path=customXml/item2.xml><?xml version="1.0" encoding="utf-8"?>
+<p:properties xmlns:p="http://schemas.microsoft.com/office/2006/metadata/properties" xmlns:xsi="http://www.w3.org/2001/XMLSchema-instance" xmlns:pc="http://schemas.microsoft.com/office/infopath/2007/PartnerControls">
+  <documentManagement/>
+</p:properties>
+</file>
+
+<file path=customXml/item3.xml><?xml version="1.0" encoding="utf-8"?>
 <ct:contentTypeSchema xmlns:ct="http://schemas.microsoft.com/office/2006/metadata/contentType" xmlns:ma="http://schemas.microsoft.com/office/2006/metadata/properties/metaAttributes" ct:_="" ma:_="" ma:contentTypeName="Document" ma:contentTypeID="0x0101000D37115C45809149A1B25D7614719B33" ma:contentTypeVersion="9" ma:contentTypeDescription="Create a new document." ma:contentTypeScope="" ma:versionID="5325b8b18c78e675d79d0126781945db">
   <xsd:schema xmlns:xsd="http://www.w3.org/2001/XMLSchema" xmlns:xs="http://www.w3.org/2001/XMLSchema" xmlns:p="http://schemas.microsoft.com/office/2006/metadata/properties" xmlns:ns2="6c4cc61b-41eb-490b-a140-7b4ebdc145d6" targetNamespace="http://schemas.microsoft.com/office/2006/metadata/properties" ma:root="true" ma:fieldsID="02110bcf47a49cbcfe2f5929584d25f5" ns2:_="">
     <xsd:import namespace="6c4cc61b-41eb-490b-a140-7b4ebdc145d6"/>
@@ -35133,12 +35139,6 @@
 </ct:contentTypeSchema>
 </file>
 
-<file path=customXml/item3.xml><?xml version="1.0" encoding="utf-8"?>
-<p:properties xmlns:p="http://schemas.microsoft.com/office/2006/metadata/properties" xmlns:xsi="http://www.w3.org/2001/XMLSchema-instance" xmlns:pc="http://schemas.microsoft.com/office/infopath/2007/PartnerControls">
-  <documentManagement/>
-</p:properties>
-</file>
-
 <file path=customXml/itemProps1.xml><?xml version="1.0" encoding="utf-8"?>
 <ds:datastoreItem xmlns:ds="http://schemas.openxmlformats.org/officeDocument/2006/customXml" ds:itemID="{71C61128-51DA-45FA-955C-6C5908F70235}">
   <ds:schemaRefs>
@@ -35148,6 +35148,22 @@
 </file>
 
 <file path=customXml/itemProps2.xml><?xml version="1.0" encoding="utf-8"?>
+<ds:datastoreItem xmlns:ds="http://schemas.openxmlformats.org/officeDocument/2006/customXml" ds:itemID="{0B83EBB4-4C44-4337-AE0E-0551485D6F4E}">
+  <ds:schemaRefs>
+    <ds:schemaRef ds:uri="http://purl.org/dc/elements/1.1/"/>
+    <ds:schemaRef ds:uri="http://schemas.microsoft.com/office/2006/metadata/properties"/>
+    <ds:schemaRef ds:uri="http://purl.org/dc/terms/"/>
+    <ds:schemaRef ds:uri="http://schemas.openxmlformats.org/package/2006/metadata/core-properties"/>
+    <ds:schemaRef ds:uri="http://schemas.microsoft.com/office/2006/documentManagement/types"/>
+    <ds:schemaRef ds:uri="http://schemas.microsoft.com/office/infopath/2007/PartnerControls"/>
+    <ds:schemaRef ds:uri="6c4cc61b-41eb-490b-a140-7b4ebdc145d6"/>
+    <ds:schemaRef ds:uri="http://www.w3.org/XML/1998/namespace"/>
+    <ds:schemaRef ds:uri="http://purl.org/dc/dcmitype/"/>
+  </ds:schemaRefs>
+</ds:datastoreItem>
+</file>
+
+<file path=customXml/itemProps3.xml><?xml version="1.0" encoding="utf-8"?>
 <ds:datastoreItem xmlns:ds="http://schemas.openxmlformats.org/officeDocument/2006/customXml" ds:itemID="{4587141A-B806-404C-92BD-9C252781BB07}">
   <ds:schemaRefs>
     <ds:schemaRef ds:uri="6c4cc61b-41eb-490b-a140-7b4ebdc145d6"/>
@@ -35163,20 +35179,4 @@
     <ds:schemaRef ds:uri="http://www.w3.org/2001/XMLSchema"/>
   </ds:schemaRefs>
 </ds:datastoreItem>
-</file>
-
-<file path=customXml/itemProps3.xml><?xml version="1.0" encoding="utf-8"?>
-<ds:datastoreItem xmlns:ds="http://schemas.openxmlformats.org/officeDocument/2006/customXml" ds:itemID="{0B83EBB4-4C44-4337-AE0E-0551485D6F4E}">
-  <ds:schemaRefs>
-    <ds:schemaRef ds:uri="http://purl.org/dc/elements/1.1/"/>
-    <ds:schemaRef ds:uri="http://schemas.microsoft.com/office/2006/metadata/properties"/>
-    <ds:schemaRef ds:uri="http://purl.org/dc/terms/"/>
-    <ds:schemaRef ds:uri="http://schemas.openxmlformats.org/package/2006/metadata/core-properties"/>
-    <ds:schemaRef ds:uri="http://schemas.microsoft.com/office/2006/documentManagement/types"/>
-    <ds:schemaRef ds:uri="http://schemas.microsoft.com/office/infopath/2007/PartnerControls"/>
-    <ds:schemaRef ds:uri="6c4cc61b-41eb-490b-a140-7b4ebdc145d6"/>
-    <ds:schemaRef ds:uri="http://www.w3.org/XML/1998/namespace"/>
-    <ds:schemaRef ds:uri="http://purl.org/dc/dcmitype/"/>
-  </ds:schemaRefs>
-</ds:datastoreItem>
 </file>
</xml_diff>